<commit_message>
Update gitbook 2021-07-16 13:49:59
</commit_message>
<xml_diff>
--- a/Session7CssIntro/HelloCss.pptx
+++ b/Session7CssIntro/HelloCss.pptx
@@ -218,7 +218,7 @@
           <a:p>
             <a:fld id="{19104133-B5B0-4351-8158-4F0E5EB1E2BF}" type="datetimeFigureOut">
               <a:rPr lang="en-US" smtClean="0"/>
-              <a:t>5/26/2021</a:t>
+              <a:t>7/16/2021</a:t>
             </a:fld>
             <a:endParaRPr lang="en-US"/>
           </a:p>
@@ -1672,7 +1672,7 @@
             <a:fld id="{1C2D31DE-C454-491C-B5C3-F097855E3DF7}" type="datetime4">
               <a:rPr lang="en-US" smtClean="0"/>
               <a:pPr/>
-              <a:t>May 26, 2021</a:t>
+              <a:t>July 16, 2021</a:t>
             </a:fld>
             <a:endParaRPr lang="en-US" dirty="0"/>
           </a:p>
@@ -5064,7 +5064,7 @@
           <a:p>
             <a:fld id="{5958763E-B898-436D-883D-03711491D54A}" type="datetimeFigureOut">
               <a:rPr lang="en-US" smtClean="0"/>
-              <a:t>5/26/2021</a:t>
+              <a:t>7/16/2021</a:t>
             </a:fld>
             <a:endParaRPr lang="en-US"/>
           </a:p>
@@ -5257,7 +5257,7 @@
           <a:p>
             <a:fld id="{5958763E-B898-436D-883D-03711491D54A}" type="datetimeFigureOut">
               <a:rPr lang="en-US" smtClean="0"/>
-              <a:t>5/26/2021</a:t>
+              <a:t>7/16/2021</a:t>
             </a:fld>
             <a:endParaRPr lang="en-US"/>
           </a:p>
@@ -5507,7 +5507,7 @@
           <a:p>
             <a:fld id="{5958763E-B898-436D-883D-03711491D54A}" type="datetimeFigureOut">
               <a:rPr lang="en-US" smtClean="0"/>
-              <a:t>5/26/2021</a:t>
+              <a:t>7/16/2021</a:t>
             </a:fld>
             <a:endParaRPr lang="en-US"/>
           </a:p>
@@ -5855,7 +5855,7 @@
           <a:p>
             <a:fld id="{5958763E-B898-436D-883D-03711491D54A}" type="datetimeFigureOut">
               <a:rPr lang="en-US" smtClean="0"/>
-              <a:t>5/26/2021</a:t>
+              <a:t>7/16/2021</a:t>
             </a:fld>
             <a:endParaRPr lang="en-US"/>
           </a:p>
@@ -6271,7 +6271,7 @@
           <a:p>
             <a:fld id="{5958763E-B898-436D-883D-03711491D54A}" type="datetimeFigureOut">
               <a:rPr lang="en-US" smtClean="0"/>
-              <a:t>5/26/2021</a:t>
+              <a:t>7/16/2021</a:t>
             </a:fld>
             <a:endParaRPr lang="en-US"/>
           </a:p>
@@ -6772,7 +6772,7 @@
           <a:p>
             <a:fld id="{5958763E-B898-436D-883D-03711491D54A}" type="datetimeFigureOut">
               <a:rPr lang="en-US" smtClean="0"/>
-              <a:t>5/26/2021</a:t>
+              <a:t>7/16/2021</a:t>
             </a:fld>
             <a:endParaRPr lang="en-US"/>
           </a:p>
@@ -7223,7 +7223,7 @@
           <a:p>
             <a:fld id="{5958763E-B898-436D-883D-03711491D54A}" type="datetimeFigureOut">
               <a:rPr lang="en-US" smtClean="0"/>
-              <a:t>5/26/2021</a:t>
+              <a:t>7/16/2021</a:t>
             </a:fld>
             <a:endParaRPr lang="en-US"/>
           </a:p>
@@ -7834,7 +7834,7 @@
           <a:p>
             <a:fld id="{5958763E-B898-436D-883D-03711491D54A}" type="datetimeFigureOut">
               <a:rPr lang="en-US" smtClean="0"/>
-              <a:t>5/26/2021</a:t>
+              <a:t>7/16/2021</a:t>
             </a:fld>
             <a:endParaRPr lang="en-US"/>
           </a:p>
@@ -8605,7 +8605,7 @@
           <a:p>
             <a:fld id="{5958763E-B898-436D-883D-03711491D54A}" type="datetimeFigureOut">
               <a:rPr lang="en-US" smtClean="0"/>
-              <a:t>5/26/2021</a:t>
+              <a:t>7/16/2021</a:t>
             </a:fld>
             <a:endParaRPr lang="en-US"/>
           </a:p>
@@ -8709,7 +8709,7 @@
           <a:p>
             <a:fld id="{5958763E-B898-436D-883D-03711491D54A}" type="datetimeFigureOut">
               <a:rPr lang="en-US" smtClean="0"/>
-              <a:t>5/26/2021</a:t>
+              <a:t>7/16/2021</a:t>
             </a:fld>
             <a:endParaRPr lang="en-US"/>
           </a:p>
@@ -9036,7 +9036,7 @@
             <a:fld id="{1C2D31DE-C454-491C-B5C3-F097855E3DF7}" type="datetime4">
               <a:rPr lang="en-US" smtClean="0"/>
               <a:pPr/>
-              <a:t>May 26, 2021</a:t>
+              <a:t>July 16, 2021</a:t>
             </a:fld>
             <a:endParaRPr lang="en-US" dirty="0"/>
           </a:p>
@@ -12188,7 +12188,7 @@
           <a:p>
             <a:fld id="{5958763E-B898-436D-883D-03711491D54A}" type="datetimeFigureOut">
               <a:rPr lang="en-US" smtClean="0"/>
-              <a:t>5/26/2021</a:t>
+              <a:t>7/16/2021</a:t>
             </a:fld>
             <a:endParaRPr lang="en-US"/>
           </a:p>
@@ -12312,7 +12312,7 @@
           <a:p>
             <a:fld id="{5958763E-B898-436D-883D-03711491D54A}" type="datetimeFigureOut">
               <a:rPr lang="en-US" smtClean="0"/>
-              <a:t>5/26/2021</a:t>
+              <a:t>7/16/2021</a:t>
             </a:fld>
             <a:endParaRPr lang="en-US"/>
           </a:p>
@@ -12436,7 +12436,7 @@
           <a:p>
             <a:fld id="{5958763E-B898-436D-883D-03711491D54A}" type="datetimeFigureOut">
               <a:rPr lang="en-US" smtClean="0"/>
-              <a:t>5/26/2021</a:t>
+              <a:t>7/16/2021</a:t>
             </a:fld>
             <a:endParaRPr lang="en-US"/>
           </a:p>
@@ -12560,7 +12560,7 @@
           <a:p>
             <a:fld id="{5958763E-B898-436D-883D-03711491D54A}" type="datetimeFigureOut">
               <a:rPr lang="en-US" smtClean="0"/>
-              <a:t>5/26/2021</a:t>
+              <a:t>7/16/2021</a:t>
             </a:fld>
             <a:endParaRPr lang="en-US"/>
           </a:p>
@@ -12684,7 +12684,7 @@
           <a:p>
             <a:fld id="{5958763E-B898-436D-883D-03711491D54A}" type="datetimeFigureOut">
               <a:rPr lang="en-US" smtClean="0"/>
-              <a:t>5/26/2021</a:t>
+              <a:t>7/16/2021</a:t>
             </a:fld>
             <a:endParaRPr lang="en-US"/>
           </a:p>
@@ -12808,7 +12808,7 @@
           <a:p>
             <a:fld id="{5958763E-B898-436D-883D-03711491D54A}" type="datetimeFigureOut">
               <a:rPr lang="en-US" smtClean="0"/>
-              <a:t>5/26/2021</a:t>
+              <a:t>7/16/2021</a:t>
             </a:fld>
             <a:endParaRPr lang="en-US"/>
           </a:p>
@@ -12932,7 +12932,7 @@
           <a:p>
             <a:fld id="{5958763E-B898-436D-883D-03711491D54A}" type="datetimeFigureOut">
               <a:rPr lang="en-US" smtClean="0"/>
-              <a:t>5/26/2021</a:t>
+              <a:t>7/16/2021</a:t>
             </a:fld>
             <a:endParaRPr lang="en-US"/>
           </a:p>
@@ -13056,7 +13056,7 @@
           <a:p>
             <a:fld id="{5958763E-B898-436D-883D-03711491D54A}" type="datetimeFigureOut">
               <a:rPr lang="en-US" smtClean="0"/>
-              <a:t>5/26/2021</a:t>
+              <a:t>7/16/2021</a:t>
             </a:fld>
             <a:endParaRPr lang="en-US"/>
           </a:p>
@@ -13189,7 +13189,7 @@
           <a:p>
             <a:fld id="{5958763E-B898-436D-883D-03711491D54A}" type="datetimeFigureOut">
               <a:rPr lang="en-US" smtClean="0"/>
-              <a:t>5/26/2021</a:t>
+              <a:t>7/16/2021</a:t>
             </a:fld>
             <a:endParaRPr lang="en-US"/>
           </a:p>
@@ -16528,7 +16528,7 @@
             <a:fld id="{1C2D31DE-C454-491C-B5C3-F097855E3DF7}" type="datetime4">
               <a:rPr lang="en-US" smtClean="0"/>
               <a:pPr/>
-              <a:t>May 26, 2021</a:t>
+              <a:t>July 16, 2021</a:t>
             </a:fld>
             <a:endParaRPr lang="en-US" dirty="0"/>
           </a:p>
@@ -28764,7 +28764,7 @@
           <a:p>
             <a:fld id="{5958763E-B898-436D-883D-03711491D54A}" type="datetimeFigureOut">
               <a:rPr lang="en-US" smtClean="0"/>
-              <a:t>5/26/2021</a:t>
+              <a:t>7/16/2021</a:t>
             </a:fld>
             <a:endParaRPr lang="en-US"/>
           </a:p>
@@ -29166,7 +29166,7 @@
           <a:p>
             <a:fld id="{5958763E-B898-436D-883D-03711491D54A}" type="datetimeFigureOut">
               <a:rPr lang="en-US" smtClean="0"/>
-              <a:t>5/26/2021</a:t>
+              <a:t>7/16/2021</a:t>
             </a:fld>
             <a:endParaRPr lang="en-US"/>
           </a:p>
@@ -29460,7 +29460,7 @@
           <a:p>
             <a:fld id="{5958763E-B898-436D-883D-03711491D54A}" type="datetimeFigureOut">
               <a:rPr lang="en-US" smtClean="0"/>
-              <a:t>5/26/2021</a:t>
+              <a:t>7/16/2021</a:t>
             </a:fld>
             <a:endParaRPr lang="en-US"/>
           </a:p>
@@ -29661,7 +29661,7 @@
           <a:p>
             <a:fld id="{5958763E-B898-436D-883D-03711491D54A}" type="datetimeFigureOut">
               <a:rPr lang="en-US" smtClean="0"/>
-              <a:t>5/26/2021</a:t>
+              <a:t>7/16/2021</a:t>
             </a:fld>
             <a:endParaRPr lang="en-US"/>
           </a:p>
@@ -29922,7 +29922,7 @@
           <a:p>
             <a:fld id="{5958763E-B898-436D-883D-03711491D54A}" type="datetimeFigureOut">
               <a:rPr lang="en-US" smtClean="0"/>
-              <a:t>5/26/2021</a:t>
+              <a:t>7/16/2021</a:t>
             </a:fld>
             <a:endParaRPr lang="en-US"/>
           </a:p>
@@ -30183,7 +30183,7 @@
           <a:p>
             <a:fld id="{61FD5E12-641C-4696-BA65-B86205845F69}" type="datetimeFigureOut">
               <a:rPr lang="en-US" smtClean="0"/>
-              <a:t>5/26/2021</a:t>
+              <a:t>7/16/2021</a:t>
             </a:fld>
             <a:endParaRPr lang="en-US"/>
           </a:p>
@@ -30353,7 +30353,7 @@
           <a:p>
             <a:fld id="{61FD5E12-641C-4696-BA65-B86205845F69}" type="datetimeFigureOut">
               <a:rPr lang="en-US" smtClean="0"/>
-              <a:t>5/26/2021</a:t>
+              <a:t>7/16/2021</a:t>
             </a:fld>
             <a:endParaRPr lang="en-US"/>
           </a:p>
@@ -30792,7 +30792,7 @@
           <a:p>
             <a:fld id="{5958763E-B898-436D-883D-03711491D54A}" type="datetimeFigureOut">
               <a:rPr lang="en-US" smtClean="0"/>
-              <a:t>5/26/2021</a:t>
+              <a:t>7/16/2021</a:t>
             </a:fld>
             <a:endParaRPr lang="en-US"/>
           </a:p>
@@ -31087,7 +31087,7 @@
           <a:p>
             <a:fld id="{61FD5E12-641C-4696-BA65-B86205845F69}" type="datetimeFigureOut">
               <a:rPr lang="en-US" smtClean="0"/>
-              <a:t>5/26/2021</a:t>
+              <a:t>7/16/2021</a:t>
             </a:fld>
             <a:endParaRPr lang="en-US"/>
           </a:p>
@@ -31319,7 +31319,7 @@
           <a:p>
             <a:fld id="{61FD5E12-641C-4696-BA65-B86205845F69}" type="datetimeFigureOut">
               <a:rPr lang="en-US" smtClean="0"/>
-              <a:t>5/26/2021</a:t>
+              <a:t>7/16/2021</a:t>
             </a:fld>
             <a:endParaRPr lang="en-US"/>
           </a:p>
@@ -31686,7 +31686,7 @@
           <a:p>
             <a:fld id="{61FD5E12-641C-4696-BA65-B86205845F69}" type="datetimeFigureOut">
               <a:rPr lang="en-US" smtClean="0"/>
-              <a:t>5/26/2021</a:t>
+              <a:t>7/16/2021</a:t>
             </a:fld>
             <a:endParaRPr lang="en-US"/>
           </a:p>
@@ -31804,7 +31804,7 @@
           <a:p>
             <a:fld id="{61FD5E12-641C-4696-BA65-B86205845F69}" type="datetimeFigureOut">
               <a:rPr lang="en-US" smtClean="0"/>
-              <a:t>5/26/2021</a:t>
+              <a:t>7/16/2021</a:t>
             </a:fld>
             <a:endParaRPr lang="en-US"/>
           </a:p>
@@ -31899,7 +31899,7 @@
           <a:p>
             <a:fld id="{61FD5E12-641C-4696-BA65-B86205845F69}" type="datetimeFigureOut">
               <a:rPr lang="en-US" smtClean="0"/>
-              <a:t>5/26/2021</a:t>
+              <a:t>7/16/2021</a:t>
             </a:fld>
             <a:endParaRPr lang="en-US"/>
           </a:p>
@@ -32176,7 +32176,7 @@
           <a:p>
             <a:fld id="{61FD5E12-641C-4696-BA65-B86205845F69}" type="datetimeFigureOut">
               <a:rPr lang="en-US" smtClean="0"/>
-              <a:t>5/26/2021</a:t>
+              <a:t>7/16/2021</a:t>
             </a:fld>
             <a:endParaRPr lang="en-US"/>
           </a:p>
@@ -32433,7 +32433,7 @@
           <a:p>
             <a:fld id="{61FD5E12-641C-4696-BA65-B86205845F69}" type="datetimeFigureOut">
               <a:rPr lang="en-US" smtClean="0"/>
-              <a:t>5/26/2021</a:t>
+              <a:t>7/16/2021</a:t>
             </a:fld>
             <a:endParaRPr lang="en-US"/>
           </a:p>
@@ -32603,7 +32603,7 @@
           <a:p>
             <a:fld id="{61FD5E12-641C-4696-BA65-B86205845F69}" type="datetimeFigureOut">
               <a:rPr lang="en-US" smtClean="0"/>
-              <a:t>5/26/2021</a:t>
+              <a:t>7/16/2021</a:t>
             </a:fld>
             <a:endParaRPr lang="en-US"/>
           </a:p>
@@ -32783,7 +32783,7 @@
           <a:p>
             <a:fld id="{61FD5E12-641C-4696-BA65-B86205845F69}" type="datetimeFigureOut">
               <a:rPr lang="en-US" smtClean="0"/>
-              <a:t>5/26/2021</a:t>
+              <a:t>7/16/2021</a:t>
             </a:fld>
             <a:endParaRPr lang="en-US"/>
           </a:p>
@@ -33429,7 +33429,7 @@
           <a:p>
             <a:fld id="{5958763E-B898-436D-883D-03711491D54A}" type="datetimeFigureOut">
               <a:rPr lang="en-US" smtClean="0"/>
-              <a:t>5/26/2021</a:t>
+              <a:t>7/16/2021</a:t>
             </a:fld>
             <a:endParaRPr lang="en-US"/>
           </a:p>
@@ -34818,7 +34818,7 @@
           <a:p>
             <a:fld id="{5958763E-B898-436D-883D-03711491D54A}" type="datetimeFigureOut">
               <a:rPr lang="en-US" smtClean="0"/>
-              <a:t>5/26/2021</a:t>
+              <a:t>7/16/2021</a:t>
             </a:fld>
             <a:endParaRPr lang="en-US"/>
           </a:p>
@@ -35019,7 +35019,7 @@
           <a:p>
             <a:fld id="{5958763E-B898-436D-883D-03711491D54A}" type="datetimeFigureOut">
               <a:rPr lang="en-US" smtClean="0"/>
-              <a:t>5/26/2021</a:t>
+              <a:t>7/16/2021</a:t>
             </a:fld>
             <a:endParaRPr lang="en-US"/>
           </a:p>
@@ -35354,7 +35354,7 @@
           <a:p>
             <a:fld id="{5958763E-B898-436D-883D-03711491D54A}" type="datetimeFigureOut">
               <a:rPr lang="en-US" smtClean="0"/>
-              <a:t>5/26/2021</a:t>
+              <a:t>7/16/2021</a:t>
             </a:fld>
             <a:endParaRPr lang="en-US"/>
           </a:p>
@@ -35584,7 +35584,7 @@
           <a:p>
             <a:fld id="{5958763E-B898-436D-883D-03711491D54A}" type="datetimeFigureOut">
               <a:rPr lang="en-US" smtClean="0"/>
-              <a:t>5/26/2021</a:t>
+              <a:t>7/16/2021</a:t>
             </a:fld>
             <a:endParaRPr lang="en-US"/>
           </a:p>
@@ -35828,7 +35828,7 @@
           <a:p>
             <a:fld id="{5958763E-B898-436D-883D-03711491D54A}" type="datetimeFigureOut">
               <a:rPr lang="en-US" smtClean="0"/>
-              <a:t>5/26/2021</a:t>
+              <a:t>7/16/2021</a:t>
             </a:fld>
             <a:endParaRPr lang="en-US"/>
           </a:p>
@@ -36469,7 +36469,7 @@
           <a:p>
             <a:fld id="{61FD5E12-641C-4696-BA65-B86205845F69}" type="datetimeFigureOut">
               <a:rPr lang="en-US" smtClean="0"/>
-              <a:t>5/26/2021</a:t>
+              <a:t>7/16/2021</a:t>
             </a:fld>
             <a:endParaRPr lang="en-US"/>
           </a:p>
@@ -40737,7 +40737,7 @@
 </file>
 
 <file path=ppt/slides/slide4.xml><?xml version="1.0" encoding="utf-8"?>
-<p:sld xmlns:a="http://schemas.openxmlformats.org/drawingml/2006/main" xmlns:r="http://schemas.openxmlformats.org/officeDocument/2006/relationships" xmlns:p="http://schemas.openxmlformats.org/presentationml/2006/main">
+<p:sld xmlns:a="http://schemas.openxmlformats.org/drawingml/2006/main" xmlns:r="http://schemas.openxmlformats.org/officeDocument/2006/relationships" xmlns:p="http://schemas.openxmlformats.org/presentationml/2006/main" show="0">
   <p:cSld>
     <p:spTree>
       <p:nvGrpSpPr>

</xml_diff>